<commit_message>
review 2 ppt change
</commit_message>
<xml_diff>
--- a/presentations/aids_review2.pptx
+++ b/presentations/aids_review2.pptx
@@ -117,6 +117,11 @@
       </a:defRPr>
     </a:lvl9pPr>
   </p:defaultTextStyle>
+  <p:extLst>
+    <p:ext uri="{EFAFB233-063F-42B5-8137-9DF3F51BA10A}">
+      <p15:sldGuideLst xmlns:p15="http://schemas.microsoft.com/office/powerpoint/2012/main"/>
+    </p:ext>
+  </p:extLst>
 </p:presentation>
 </file>
 
@@ -316,7 +321,7 @@
           <a:p>
             <a:fld id="{ECD19FB2-3AAB-4D03-B13A-2960828C78E3}" type="datetimeFigureOut">
               <a:rPr lang="en-US" smtClean="0"/>
-              <a:t>3/2/2022</a:t>
+              <a:t>3/3/2022</a:t>
             </a:fld>
             <a:endParaRPr lang="en-US" dirty="0"/>
           </a:p>
@@ -598,7 +603,7 @@
           <a:p>
             <a:fld id="{1B80C674-7DFC-42FE-B9CD-82963CDB1557}" type="datetimeFigureOut">
               <a:rPr lang="en-US" smtClean="0"/>
-              <a:t>3/2/2022</a:t>
+              <a:t>3/3/2022</a:t>
             </a:fld>
             <a:endParaRPr lang="en-US" dirty="0"/>
           </a:p>
@@ -790,7 +795,7 @@
           <a:p>
             <a:fld id="{2076456F-F47D-4F25-8053-2A695DA0CA7D}" type="datetimeFigureOut">
               <a:rPr lang="en-US" smtClean="0"/>
-              <a:t>3/2/2022</a:t>
+              <a:t>3/3/2022</a:t>
             </a:fld>
             <a:endParaRPr lang="en-US" dirty="0"/>
           </a:p>
@@ -1051,7 +1056,7 @@
           <a:p>
             <a:fld id="{5D6C7379-69CC-4837-9905-BEBA22830C8A}" type="datetimeFigureOut">
               <a:rPr lang="en-US" smtClean="0"/>
-              <a:t>3/2/2022</a:t>
+              <a:t>3/3/2022</a:t>
             </a:fld>
             <a:endParaRPr lang="en-US" dirty="0"/>
           </a:p>
@@ -1477,7 +1482,7 @@
           <a:p>
             <a:fld id="{49EB8B7E-8AEE-4F10-BFEE-C999AD004D36}" type="datetimeFigureOut">
               <a:rPr lang="en-US" smtClean="0"/>
-              <a:t>3/2/2022</a:t>
+              <a:t>3/3/2022</a:t>
             </a:fld>
             <a:endParaRPr lang="en-US" dirty="0"/>
           </a:p>
@@ -2023,7 +2028,7 @@
           <a:p>
             <a:fld id="{8668F3F9-58BC-440B-B37B-805B9055EF92}" type="datetimeFigureOut">
               <a:rPr lang="en-US" smtClean="0"/>
-              <a:t>3/2/2022</a:t>
+              <a:t>3/3/2022</a:t>
             </a:fld>
             <a:endParaRPr lang="en-US" dirty="0"/>
           </a:p>
@@ -2854,7 +2859,7 @@
           <a:p>
             <a:fld id="{0D5A53AF-48EA-489D-8260-9DCAB666386A}" type="datetimeFigureOut">
               <a:rPr lang="en-US" smtClean="0"/>
-              <a:t>3/2/2022</a:t>
+              <a:t>3/3/2022</a:t>
             </a:fld>
             <a:endParaRPr lang="en-US" dirty="0"/>
           </a:p>
@@ -3024,7 +3029,7 @@
           <a:p>
             <a:fld id="{0DED02AE-B9A4-47BD-AF8E-97E16144138B}" type="datetimeFigureOut">
               <a:rPr lang="en-US" smtClean="0"/>
-              <a:t>3/2/2022</a:t>
+              <a:t>3/3/2022</a:t>
             </a:fld>
             <a:endParaRPr lang="en-US" dirty="0"/>
           </a:p>
@@ -3204,7 +3209,7 @@
           <a:p>
             <a:fld id="{CF0FD78B-DB02-4362-BCDC-98A55456977C}" type="datetimeFigureOut">
               <a:rPr lang="en-US" smtClean="0"/>
-              <a:t>3/2/2022</a:t>
+              <a:t>3/3/2022</a:t>
             </a:fld>
             <a:endParaRPr lang="en-US" dirty="0"/>
           </a:p>
@@ -3374,7 +3379,7 @@
           <a:p>
             <a:fld id="{99916976-5D93-46E4-A98A-FAD63E4D0EA8}" type="datetimeFigureOut">
               <a:rPr lang="en-US" smtClean="0"/>
-              <a:t>3/2/2022</a:t>
+              <a:t>3/3/2022</a:t>
             </a:fld>
             <a:endParaRPr lang="en-US" dirty="0"/>
           </a:p>
@@ -3631,7 +3636,7 @@
           <a:p>
             <a:fld id="{0F39F4F5-F4D2-4D2A-AB60-88D37ADCB869}" type="datetimeFigureOut">
               <a:rPr lang="en-US" smtClean="0"/>
-              <a:t>3/2/2022</a:t>
+              <a:t>3/3/2022</a:t>
             </a:fld>
             <a:endParaRPr lang="en-US" dirty="0"/>
           </a:p>
@@ -3863,7 +3868,7 @@
           <a:p>
             <a:fld id="{D23BC6CE-6D1E-47E5-8859-F31AC5380EB2}" type="datetimeFigureOut">
               <a:rPr lang="en-US" smtClean="0"/>
-              <a:t>3/2/2022</a:t>
+              <a:t>3/3/2022</a:t>
             </a:fld>
             <a:endParaRPr lang="en-US" dirty="0"/>
           </a:p>
@@ -4256,7 +4261,7 @@
           <a:p>
             <a:fld id="{B1B4E7C4-4DA4-404D-9965-B13F2DD7D8BF}" type="datetimeFigureOut">
               <a:rPr lang="en-US" smtClean="0"/>
-              <a:t>3/2/2022</a:t>
+              <a:t>3/3/2022</a:t>
             </a:fld>
             <a:endParaRPr lang="en-US" dirty="0"/>
           </a:p>
@@ -4374,7 +4379,7 @@
           <a:p>
             <a:fld id="{476FB7AA-4A53-424F-AD41-70827B6504BA}" type="datetimeFigureOut">
               <a:rPr lang="en-US" smtClean="0"/>
-              <a:t>3/2/2022</a:t>
+              <a:t>3/3/2022</a:t>
             </a:fld>
             <a:endParaRPr lang="en-US" dirty="0"/>
           </a:p>
@@ -4469,7 +4474,7 @@
           <a:p>
             <a:fld id="{E7884882-FB12-4BC8-9960-9AD8104D7FAE}" type="datetimeFigureOut">
               <a:rPr lang="en-US" smtClean="0"/>
-              <a:t>3/2/2022</a:t>
+              <a:t>3/3/2022</a:t>
             </a:fld>
             <a:endParaRPr lang="en-US" dirty="0"/>
           </a:p>
@@ -4742,7 +4747,7 @@
           <a:p>
             <a:fld id="{F7D1BD23-6E54-4D9D-AD88-A2813C73CC25}" type="datetimeFigureOut">
               <a:rPr lang="en-US" smtClean="0"/>
-              <a:t>3/2/2022</a:t>
+              <a:t>3/3/2022</a:t>
             </a:fld>
             <a:endParaRPr lang="en-US" dirty="0"/>
           </a:p>
@@ -5023,7 +5028,7 @@
           <a:p>
             <a:fld id="{1471A834-4F3C-4AF9-9C74-05EC35A0F292}" type="datetimeFigureOut">
               <a:rPr lang="en-US" smtClean="0"/>
-              <a:t>3/2/2022</a:t>
+              <a:t>3/3/2022</a:t>
             </a:fld>
             <a:endParaRPr lang="en-US" dirty="0"/>
           </a:p>
@@ -5254,7 +5259,7 @@
           <a:p>
             <a:fld id="{51CF1133-3259-4C45-BABA-5B62D9C6F78D}" type="datetimeFigureOut">
               <a:rPr lang="en-US" smtClean="0"/>
-              <a:t>3/2/2022</a:t>
+              <a:t>3/3/2022</a:t>
             </a:fld>
             <a:endParaRPr lang="en-US" dirty="0"/>
           </a:p>
@@ -8730,7 +8735,19 @@
           </p:nvPr>
         </p:nvPicPr>
         <p:blipFill>
-          <a:blip r:embed="rId2"/>
+          <a:blip r:embed="rId2">
+            <a:extLst>
+              <a:ext uri="{BEBA8EAE-BF5A-486C-A8C5-ECC9F3942E4B}">
+                <a14:imgProps xmlns:a14="http://schemas.microsoft.com/office/drawing/2010/main">
+                  <a14:imgLayer r:embed="rId3">
+                    <a14:imgEffect>
+                      <a14:brightnessContrast bright="-20000" contrast="40000"/>
+                    </a14:imgEffect>
+                  </a14:imgLayer>
+                </a14:imgProps>
+              </a:ext>
+            </a:extLst>
+          </a:blip>
           <a:stretch>
             <a:fillRect/>
           </a:stretch>

</xml_diff>

<commit_message>
flowhcart edit in review 2
</commit_message>
<xml_diff>
--- a/presentations/aids_review2.pptx
+++ b/presentations/aids_review2.pptx
@@ -8730,10 +8730,10 @@
       </p:sp>
       <p:pic>
         <p:nvPicPr>
-          <p:cNvPr id="4" name="Picture 3">
+          <p:cNvPr id="5" name="Picture 4">
             <a:extLst>
               <a:ext uri="{FF2B5EF4-FFF2-40B4-BE49-F238E27FC236}">
-                <a16:creationId xmlns:a16="http://schemas.microsoft.com/office/drawing/2014/main" id="{3EE937D7-0D34-4C36-9802-77FBBFF37487}"/>
+                <a16:creationId xmlns:a16="http://schemas.microsoft.com/office/drawing/2014/main" id="{2329E7A5-A1C4-4F09-A325-5EA4C66CC866}"/>
               </a:ext>
             </a:extLst>
           </p:cNvPr>
@@ -8750,8 +8750,8 @@
         </p:blipFill>
         <p:spPr>
           <a:xfrm>
-            <a:off x="2045925" y="1230313"/>
-            <a:ext cx="7338687" cy="5354882"/>
+            <a:off x="1846801" y="1063378"/>
+            <a:ext cx="8498397" cy="5640776"/>
           </a:xfrm>
           <a:prstGeom prst="rect">
             <a:avLst/>

</xml_diff>